<commit_message>
Incremented the version number.
</commit_message>
<xml_diff>
--- a/JViewer.pptx
+++ b/JViewer.pptx
@@ -126,12 +126,12 @@
   <pc:docChgLst>
     <pc:chgData name="Edward Gottsman" userId="36c476935d4ba90c" providerId="LiveId" clId="{432474DA-DE84-A84D-A89E-50CA92F3205A}"/>
     <pc:docChg chg="undo custSel modSld">
-      <pc:chgData name="Edward Gottsman" userId="36c476935d4ba90c" providerId="LiveId" clId="{432474DA-DE84-A84D-A89E-50CA92F3205A}" dt="2023-12-19T12:19:04.096" v="194" actId="1037"/>
+      <pc:chgData name="Edward Gottsman" userId="36c476935d4ba90c" providerId="LiveId" clId="{432474DA-DE84-A84D-A89E-50CA92F3205A}" dt="2023-12-20T14:23:31.919" v="239" actId="20577"/>
       <pc:docMkLst>
         <pc:docMk/>
       </pc:docMkLst>
       <pc:sldChg chg="modSp mod">
-        <pc:chgData name="Edward Gottsman" userId="36c476935d4ba90c" providerId="LiveId" clId="{432474DA-DE84-A84D-A89E-50CA92F3205A}" dt="2023-12-19T12:19:04.096" v="194" actId="1037"/>
+        <pc:chgData name="Edward Gottsman" userId="36c476935d4ba90c" providerId="LiveId" clId="{432474DA-DE84-A84D-A89E-50CA92F3205A}" dt="2023-12-20T14:23:31.919" v="239" actId="20577"/>
         <pc:sldMkLst>
           <pc:docMk/>
           <pc:sldMk cId="2097335871" sldId="257"/>
@@ -145,7 +145,7 @@
           </ac:spMkLst>
         </pc:spChg>
         <pc:spChg chg="mod">
-          <ac:chgData name="Edward Gottsman" userId="36c476935d4ba90c" providerId="LiveId" clId="{432474DA-DE84-A84D-A89E-50CA92F3205A}" dt="2023-12-19T12:15:05.851" v="179" actId="1035"/>
+          <ac:chgData name="Edward Gottsman" userId="36c476935d4ba90c" providerId="LiveId" clId="{432474DA-DE84-A84D-A89E-50CA92F3205A}" dt="2023-12-20T14:23:31.919" v="239" actId="20577"/>
           <ac:spMkLst>
             <pc:docMk/>
             <pc:sldMk cId="2097335871" sldId="257"/>
@@ -3685,7 +3685,7 @@
         <p:spPr>
           <a:xfrm>
             <a:off x="73576" y="3151399"/>
-            <a:ext cx="12023834" cy="1569660"/>
+            <a:ext cx="12023834" cy="1446550"/>
           </a:xfrm>
           <a:prstGeom prst="rect">
             <a:avLst/>
@@ -3700,7 +3700,7 @@
           <a:p>
             <a:pPr algn="ctr"/>
             <a:r>
-              <a:rPr lang="en-US" sz="4800" dirty="0">
+              <a:rPr lang="en-US" sz="4400" dirty="0">
                 <a:latin typeface="Apple Braille Outline 8 Dot" pitchFamily="2" charset="0"/>
               </a:rPr>
               <a:t>Wiki • Forums • GitHub</a:t>
@@ -3709,18 +3709,24 @@
           <a:p>
             <a:pPr algn="ctr"/>
             <a:r>
-              <a:rPr lang="en-US" sz="4800" dirty="0">
+              <a:rPr lang="en-US" sz="4400">
                 <a:latin typeface="Apple Braille Outline 8 Dot" pitchFamily="2" charset="0"/>
               </a:rPr>
-              <a:t>Quora • </a:t>
-            </a:r>
-            <a:r>
-              <a:rPr lang="en-US" sz="4800" dirty="0" err="1">
+              <a:t>	YouTube • Quora </a:t>
+            </a:r>
+            <a:r>
+              <a:rPr lang="en-US" sz="4400" dirty="0">
+                <a:latin typeface="Apple Braille Outline 8 Dot" pitchFamily="2" charset="0"/>
+              </a:rPr>
+              <a:t>• </a:t>
+            </a:r>
+            <a:r>
+              <a:rPr lang="en-US" sz="4400" dirty="0" err="1">
                 <a:latin typeface="Apple Braille Outline 8 Dot" pitchFamily="2" charset="0"/>
               </a:rPr>
               <a:t>RosettaCode</a:t>
             </a:r>
-            <a:endParaRPr lang="en-US" sz="4800" dirty="0">
+            <a:endParaRPr lang="en-US" sz="4400" dirty="0">
               <a:latin typeface="Apple Braille Outline 8 Dot" pitchFamily="2" charset="0"/>
             </a:endParaRPr>
           </a:p>

</xml_diff>

<commit_message>
Attempt to use text fragments for intra-page navigation in search results.  Commented out for posterity.
</commit_message>
<xml_diff>
--- a/JViewer.pptx
+++ b/JViewer.pptx
@@ -126,12 +126,12 @@
   <pc:docChgLst>
     <pc:chgData name="Edward Gottsman" userId="36c476935d4ba90c" providerId="LiveId" clId="{432474DA-DE84-A84D-A89E-50CA92F3205A}"/>
     <pc:docChg chg="undo custSel modSld">
-      <pc:chgData name="Edward Gottsman" userId="36c476935d4ba90c" providerId="LiveId" clId="{432474DA-DE84-A84D-A89E-50CA92F3205A}" dt="2023-12-20T14:23:31.919" v="239" actId="20577"/>
+      <pc:chgData name="Edward Gottsman" userId="36c476935d4ba90c" providerId="LiveId" clId="{432474DA-DE84-A84D-A89E-50CA92F3205A}" dt="2023-12-22T12:01:11.026" v="259" actId="20577"/>
       <pc:docMkLst>
         <pc:docMk/>
       </pc:docMkLst>
       <pc:sldChg chg="modSp mod">
-        <pc:chgData name="Edward Gottsman" userId="36c476935d4ba90c" providerId="LiveId" clId="{432474DA-DE84-A84D-A89E-50CA92F3205A}" dt="2023-12-20T14:23:31.919" v="239" actId="20577"/>
+        <pc:chgData name="Edward Gottsman" userId="36c476935d4ba90c" providerId="LiveId" clId="{432474DA-DE84-A84D-A89E-50CA92F3205A}" dt="2023-12-22T12:01:11.026" v="259" actId="20577"/>
         <pc:sldMkLst>
           <pc:docMk/>
           <pc:sldMk cId="2097335871" sldId="257"/>
@@ -145,7 +145,7 @@
           </ac:spMkLst>
         </pc:spChg>
         <pc:spChg chg="mod">
-          <ac:chgData name="Edward Gottsman" userId="36c476935d4ba90c" providerId="LiveId" clId="{432474DA-DE84-A84D-A89E-50CA92F3205A}" dt="2023-12-20T14:23:31.919" v="239" actId="20577"/>
+          <ac:chgData name="Edward Gottsman" userId="36c476935d4ba90c" providerId="LiveId" clId="{432474DA-DE84-A84D-A89E-50CA92F3205A}" dt="2023-12-22T12:01:11.026" v="259" actId="20577"/>
           <ac:spMkLst>
             <pc:docMk/>
             <pc:sldMk cId="2097335871" sldId="257"/>
@@ -3709,16 +3709,10 @@
           <a:p>
             <a:pPr algn="ctr"/>
             <a:r>
-              <a:rPr lang="en-US" sz="4400">
-                <a:latin typeface="Apple Braille Outline 8 Dot" pitchFamily="2" charset="0"/>
-              </a:rPr>
-              <a:t>	YouTube • Quora </a:t>
-            </a:r>
-            <a:r>
               <a:rPr lang="en-US" sz="4400" dirty="0">
                 <a:latin typeface="Apple Braille Outline 8 Dot" pitchFamily="2" charset="0"/>
               </a:rPr>
-              <a:t>• </a:t>
+              <a:t>YouTube • Quora • </a:t>
             </a:r>
             <a:r>
               <a:rPr lang="en-US" sz="4400" dirty="0" err="1">

</xml_diff>

<commit_message>
Added "[Wiki]" to the front of Wiki page names in the results display.  Added year to the front of forum subjects in the results display.
</commit_message>
<xml_diff>
--- a/JViewer.pptx
+++ b/JViewer.pptx
@@ -116,7 +116,7 @@
 <file path=ppt/revisionInfo.xml><?xml version="1.0" encoding="utf-8"?>
 <p1510:revInfo xmlns:a="http://schemas.openxmlformats.org/drawingml/2006/main" xmlns:r="http://schemas.openxmlformats.org/officeDocument/2006/relationships" xmlns:p1510="http://schemas.microsoft.com/office/powerpoint/2015/10/main">
   <p1510:revLst>
-    <p1510:client id="{432474DA-DE84-A84D-A89E-50CA92F3205A}" v="83" dt="2023-12-19T12:19:04.096"/>
+    <p1510:client id="{432474DA-DE84-A84D-A89E-50CA92F3205A}" v="87" dt="2023-12-26T14:26:26.985"/>
   </p1510:revLst>
 </p1510:revInfo>
 </file>
@@ -126,12 +126,12 @@
   <pc:docChgLst>
     <pc:chgData name="Edward Gottsman" userId="36c476935d4ba90c" providerId="LiveId" clId="{432474DA-DE84-A84D-A89E-50CA92F3205A}"/>
     <pc:docChg chg="undo custSel modSld">
-      <pc:chgData name="Edward Gottsman" userId="36c476935d4ba90c" providerId="LiveId" clId="{432474DA-DE84-A84D-A89E-50CA92F3205A}" dt="2023-12-22T12:01:11.026" v="259" actId="20577"/>
+      <pc:chgData name="Edward Gottsman" userId="36c476935d4ba90c" providerId="LiveId" clId="{432474DA-DE84-A84D-A89E-50CA92F3205A}" dt="2023-12-26T14:26:26.985" v="263" actId="1076"/>
       <pc:docMkLst>
         <pc:docMk/>
       </pc:docMkLst>
-      <pc:sldChg chg="modSp mod">
-        <pc:chgData name="Edward Gottsman" userId="36c476935d4ba90c" providerId="LiveId" clId="{432474DA-DE84-A84D-A89E-50CA92F3205A}" dt="2023-12-22T12:01:11.026" v="259" actId="20577"/>
+      <pc:sldChg chg="addSp modSp mod">
+        <pc:chgData name="Edward Gottsman" userId="36c476935d4ba90c" providerId="LiveId" clId="{432474DA-DE84-A84D-A89E-50CA92F3205A}" dt="2023-12-26T14:26:26.985" v="263" actId="1076"/>
         <pc:sldMkLst>
           <pc:docMk/>
           <pc:sldMk cId="2097335871" sldId="257"/>
@@ -168,8 +168,16 @@
             <ac:spMk id="7" creationId="{9E664E1F-DA3D-941F-7E6C-8570E87C47E3}"/>
           </ac:spMkLst>
         </pc:spChg>
+        <pc:picChg chg="add mod">
+          <ac:chgData name="Edward Gottsman" userId="36c476935d4ba90c" providerId="LiveId" clId="{432474DA-DE84-A84D-A89E-50CA92F3205A}" dt="2023-12-26T14:26:23.052" v="261" actId="571"/>
+          <ac:picMkLst>
+            <pc:docMk/>
+            <pc:sldMk cId="2097335871" sldId="257"/>
+            <ac:picMk id="2" creationId="{68801B3E-341F-A75F-442D-1270E25593ED}"/>
+          </ac:picMkLst>
+        </pc:picChg>
         <pc:picChg chg="mod">
-          <ac:chgData name="Edward Gottsman" userId="36c476935d4ba90c" providerId="LiveId" clId="{432474DA-DE84-A84D-A89E-50CA92F3205A}" dt="2023-12-19T12:19:04.096" v="194" actId="1037"/>
+          <ac:chgData name="Edward Gottsman" userId="36c476935d4ba90c" providerId="LiveId" clId="{432474DA-DE84-A84D-A89E-50CA92F3205A}" dt="2023-12-26T14:26:26.985" v="263" actId="1076"/>
           <ac:picMkLst>
             <pc:docMk/>
             <pc:sldMk cId="2097335871" sldId="257"/>

</xml_diff>

<commit_message>
Minor update to Jviewer.pptx.  Loaddb.ijs now waits 10 seconds between repository retrievals.  Run.ijs moves the working directory to ~user/jviewer/.  Incremented version number.
</commit_message>
<xml_diff>
--- a/JViewer.pptx
+++ b/JViewer.pptx
@@ -125,8 +125,8 @@
 <pc:chgInfo xmlns:a="http://schemas.openxmlformats.org/drawingml/2006/main" xmlns:r="http://schemas.openxmlformats.org/officeDocument/2006/relationships" xmlns:ac="http://schemas.microsoft.com/office/drawing/2013/main/command" xmlns:pc="http://schemas.microsoft.com/office/powerpoint/2013/main/command">
   <pc:docChgLst>
     <pc:chgData name="Edward Gottsman" userId="36c476935d4ba90c" providerId="LiveId" clId="{432474DA-DE84-A84D-A89E-50CA92F3205A}"/>
-    <pc:docChg chg="undo custSel modSld">
-      <pc:chgData name="Edward Gottsman" userId="36c476935d4ba90c" providerId="LiveId" clId="{432474DA-DE84-A84D-A89E-50CA92F3205A}" dt="2023-12-26T14:26:26.985" v="263" actId="1076"/>
+    <pc:docChg chg="undo custSel addSld delSld modSld">
+      <pc:chgData name="Edward Gottsman" userId="36c476935d4ba90c" providerId="LiveId" clId="{432474DA-DE84-A84D-A89E-50CA92F3205A}" dt="2024-03-07T15:31:29.200" v="347" actId="2696"/>
       <pc:docMkLst>
         <pc:docMk/>
       </pc:docMkLst>
@@ -185,6 +185,29 @@
           </ac:picMkLst>
         </pc:picChg>
       </pc:sldChg>
+      <pc:sldChg chg="addSp modSp new del mod modClrScheme chgLayout">
+        <pc:chgData name="Edward Gottsman" userId="36c476935d4ba90c" providerId="LiveId" clId="{432474DA-DE84-A84D-A89E-50CA92F3205A}" dt="2024-03-07T15:31:29.200" v="347" actId="2696"/>
+        <pc:sldMkLst>
+          <pc:docMk/>
+          <pc:sldMk cId="3345801856" sldId="258"/>
+        </pc:sldMkLst>
+        <pc:spChg chg="mod ord">
+          <ac:chgData name="Edward Gottsman" userId="36c476935d4ba90c" providerId="LiveId" clId="{432474DA-DE84-A84D-A89E-50CA92F3205A}" dt="2024-03-07T14:08:29.216" v="345" actId="700"/>
+          <ac:spMkLst>
+            <pc:docMk/>
+            <pc:sldMk cId="3345801856" sldId="258"/>
+            <ac:spMk id="2" creationId="{E51380E0-AC6D-5126-D1AE-5F4753F65C0C}"/>
+          </ac:spMkLst>
+        </pc:spChg>
+        <pc:spChg chg="add mod ord">
+          <ac:chgData name="Edward Gottsman" userId="36c476935d4ba90c" providerId="LiveId" clId="{432474DA-DE84-A84D-A89E-50CA92F3205A}" dt="2024-03-07T14:08:51.567" v="346" actId="5793"/>
+          <ac:spMkLst>
+            <pc:docMk/>
+            <pc:sldMk cId="3345801856" sldId="258"/>
+            <ac:spMk id="3" creationId="{91702521-4904-42FC-79E0-DF92271677AC}"/>
+          </ac:spMkLst>
+        </pc:spChg>
+      </pc:sldChg>
     </pc:docChg>
   </pc:docChgLst>
 </pc:chgInfo>
@@ -337,7 +360,7 @@
           <a:p>
             <a:fld id="{B803B498-C3BF-394E-8CDD-560FA794E6BC}" type="datetimeFigureOut">
               <a:rPr lang="en-US" smtClean="0"/>
-              <a:t>12/19/23</a:t>
+              <a:t>3/7/24</a:t>
             </a:fld>
             <a:endParaRPr lang="en-US"/>
           </a:p>
@@ -535,7 +558,7 @@
           <a:p>
             <a:fld id="{B803B498-C3BF-394E-8CDD-560FA794E6BC}" type="datetimeFigureOut">
               <a:rPr lang="en-US" smtClean="0"/>
-              <a:t>12/19/23</a:t>
+              <a:t>3/7/24</a:t>
             </a:fld>
             <a:endParaRPr lang="en-US"/>
           </a:p>
@@ -743,7 +766,7 @@
           <a:p>
             <a:fld id="{B803B498-C3BF-394E-8CDD-560FA794E6BC}" type="datetimeFigureOut">
               <a:rPr lang="en-US" smtClean="0"/>
-              <a:t>12/19/23</a:t>
+              <a:t>3/7/24</a:t>
             </a:fld>
             <a:endParaRPr lang="en-US"/>
           </a:p>
@@ -941,7 +964,7 @@
           <a:p>
             <a:fld id="{B803B498-C3BF-394E-8CDD-560FA794E6BC}" type="datetimeFigureOut">
               <a:rPr lang="en-US" smtClean="0"/>
-              <a:t>12/19/23</a:t>
+              <a:t>3/7/24</a:t>
             </a:fld>
             <a:endParaRPr lang="en-US"/>
           </a:p>
@@ -1216,7 +1239,7 @@
           <a:p>
             <a:fld id="{B803B498-C3BF-394E-8CDD-560FA794E6BC}" type="datetimeFigureOut">
               <a:rPr lang="en-US" smtClean="0"/>
-              <a:t>12/19/23</a:t>
+              <a:t>3/7/24</a:t>
             </a:fld>
             <a:endParaRPr lang="en-US"/>
           </a:p>
@@ -1481,7 +1504,7 @@
           <a:p>
             <a:fld id="{B803B498-C3BF-394E-8CDD-560FA794E6BC}" type="datetimeFigureOut">
               <a:rPr lang="en-US" smtClean="0"/>
-              <a:t>12/19/23</a:t>
+              <a:t>3/7/24</a:t>
             </a:fld>
             <a:endParaRPr lang="en-US"/>
           </a:p>
@@ -1893,7 +1916,7 @@
           <a:p>
             <a:fld id="{B803B498-C3BF-394E-8CDD-560FA794E6BC}" type="datetimeFigureOut">
               <a:rPr lang="en-US" smtClean="0"/>
-              <a:t>12/19/23</a:t>
+              <a:t>3/7/24</a:t>
             </a:fld>
             <a:endParaRPr lang="en-US"/>
           </a:p>
@@ -2034,7 +2057,7 @@
           <a:p>
             <a:fld id="{B803B498-C3BF-394E-8CDD-560FA794E6BC}" type="datetimeFigureOut">
               <a:rPr lang="en-US" smtClean="0"/>
-              <a:t>12/19/23</a:t>
+              <a:t>3/7/24</a:t>
             </a:fld>
             <a:endParaRPr lang="en-US"/>
           </a:p>
@@ -2147,7 +2170,7 @@
           <a:p>
             <a:fld id="{B803B498-C3BF-394E-8CDD-560FA794E6BC}" type="datetimeFigureOut">
               <a:rPr lang="en-US" smtClean="0"/>
-              <a:t>12/19/23</a:t>
+              <a:t>3/7/24</a:t>
             </a:fld>
             <a:endParaRPr lang="en-US"/>
           </a:p>
@@ -2458,7 +2481,7 @@
           <a:p>
             <a:fld id="{B803B498-C3BF-394E-8CDD-560FA794E6BC}" type="datetimeFigureOut">
               <a:rPr lang="en-US" smtClean="0"/>
-              <a:t>12/19/23</a:t>
+              <a:t>3/7/24</a:t>
             </a:fld>
             <a:endParaRPr lang="en-US"/>
           </a:p>
@@ -2746,7 +2769,7 @@
           <a:p>
             <a:fld id="{B803B498-C3BF-394E-8CDD-560FA794E6BC}" type="datetimeFigureOut">
               <a:rPr lang="en-US" smtClean="0"/>
-              <a:t>12/19/23</a:t>
+              <a:t>3/7/24</a:t>
             </a:fld>
             <a:endParaRPr lang="en-US"/>
           </a:p>
@@ -2987,7 +3010,7 @@
           <a:p>
             <a:fld id="{B803B498-C3BF-394E-8CDD-560FA794E6BC}" type="datetimeFigureOut">
               <a:rPr lang="en-US" smtClean="0"/>
-              <a:t>12/19/23</a:t>
+              <a:t>3/7/24</a:t>
             </a:fld>
             <a:endParaRPr lang="en-US"/>
           </a:p>

</xml_diff>